<commit_message>
Correct blog email address on PowerPoint
</commit_message>
<xml_diff>
--- a/UKCloudInfrastructureUserGroup/09-01-2019 - Getting started with Terraform/UK Cloud Infrastructure User Group - Getting started with Terraform.pptx
+++ b/UKCloudInfrastructureUserGroup/09-01-2019 - Getting started with Terraform/UK Cloud Infrastructure User Group - Getting started with Terraform.pptx
@@ -233,7 +233,7 @@
           <a:p>
             <a:fld id="{00493A3E-02C8-44E0-A167-A9E6EEC85CB9}" type="datetimeFigureOut">
               <a:rPr lang="en-GB" smtClean="0"/>
-              <a:t>09/01/2019</a:t>
+              <a:t>10/01/2019</a:t>
             </a:fld>
             <a:endParaRPr lang="en-GB"/>
           </a:p>
@@ -398,7 +398,7 @@
           <a:p>
             <a:fld id="{3BC85123-DEC5-40C7-B7D1-0442CFA3575D}" type="datetimeFigureOut">
               <a:rPr lang="en-GB" smtClean="0"/>
-              <a:t>09/01/2019</a:t>
+              <a:t>10/01/2019</a:t>
             </a:fld>
             <a:endParaRPr lang="en-GB"/>
           </a:p>
@@ -3645,7 +3645,7 @@
           <a:p>
             <a:fld id="{48A87A34-81AB-432B-8DAE-1953F412C126}" type="datetimeFigureOut">
               <a:rPr lang="en-US" smtClean="0"/>
-              <a:t>1/9/2019</a:t>
+              <a:t>1/10/2019</a:t>
             </a:fld>
             <a:endParaRPr lang="en-US" dirty="0"/>
           </a:p>
@@ -4710,7 +4710,7 @@
           <a:p>
             <a:fld id="{48A87A34-81AB-432B-8DAE-1953F412C126}" type="datetimeFigureOut">
               <a:rPr lang="en-US" smtClean="0"/>
-              <a:t>1/9/2019</a:t>
+              <a:t>1/10/2019</a:t>
             </a:fld>
             <a:endParaRPr lang="en-US" dirty="0"/>
           </a:p>
@@ -5699,7 +5699,7 @@
             <a:fld id="{48A87A34-81AB-432B-8DAE-1953F412C126}" type="datetimeFigureOut">
               <a:rPr lang="en-US" smtClean="0"/>
               <a:pPr/>
-              <a:t>1/9/2019</a:t>
+              <a:t>1/10/2019</a:t>
             </a:fld>
             <a:endParaRPr lang="en-US" dirty="0"/>
           </a:p>
@@ -6842,7 +6842,7 @@
             <a:fld id="{48A87A34-81AB-432B-8DAE-1953F412C126}" type="datetimeFigureOut">
               <a:rPr lang="en-US" smtClean="0"/>
               <a:pPr/>
-              <a:t>1/9/2019</a:t>
+              <a:t>1/10/2019</a:t>
             </a:fld>
             <a:endParaRPr lang="en-US" dirty="0"/>
           </a:p>
@@ -7884,7 +7884,7 @@
             <a:fld id="{48A87A34-81AB-432B-8DAE-1953F412C126}" type="datetimeFigureOut">
               <a:rPr lang="en-US" smtClean="0"/>
               <a:pPr/>
-              <a:t>1/9/2019</a:t>
+              <a:t>1/10/2019</a:t>
             </a:fld>
             <a:endParaRPr lang="en-US" dirty="0"/>
           </a:p>
@@ -8552,7 +8552,7 @@
           <a:p>
             <a:fld id="{48A87A34-81AB-432B-8DAE-1953F412C126}" type="datetimeFigureOut">
               <a:rPr lang="en-US" smtClean="0"/>
-              <a:t>1/9/2019</a:t>
+              <a:t>1/10/2019</a:t>
             </a:fld>
             <a:endParaRPr lang="en-US" dirty="0"/>
           </a:p>
@@ -9421,7 +9421,7 @@
           <a:p>
             <a:fld id="{48A87A34-81AB-432B-8DAE-1953F412C126}" type="datetimeFigureOut">
               <a:rPr lang="en-US" smtClean="0"/>
-              <a:t>1/9/2019</a:t>
+              <a:t>1/10/2019</a:t>
             </a:fld>
             <a:endParaRPr lang="en-US" dirty="0"/>
           </a:p>
@@ -9619,7 +9619,7 @@
           <a:p>
             <a:fld id="{48A87A34-81AB-432B-8DAE-1953F412C126}" type="datetimeFigureOut">
               <a:rPr lang="en-US" smtClean="0"/>
-              <a:t>1/9/2019</a:t>
+              <a:t>1/10/2019</a:t>
             </a:fld>
             <a:endParaRPr lang="en-US" dirty="0"/>
           </a:p>
@@ -10600,7 +10600,7 @@
             <a:fld id="{48A87A34-81AB-432B-8DAE-1953F412C126}" type="datetimeFigureOut">
               <a:rPr lang="en-US" smtClean="0"/>
               <a:pPr/>
-              <a:t>1/9/2019</a:t>
+              <a:t>1/10/2019</a:t>
             </a:fld>
             <a:endParaRPr lang="en-US" dirty="0"/>
           </a:p>
@@ -15869,7 +15869,7 @@
             <a:fld id="{48A87A34-81AB-432B-8DAE-1953F412C126}" type="datetimeFigureOut">
               <a:rPr lang="en-US" smtClean="0"/>
               <a:pPr/>
-              <a:t>1/9/2019</a:t>
+              <a:t>1/10/2019</a:t>
             </a:fld>
             <a:endParaRPr lang="en-US" dirty="0"/>
           </a:p>
@@ -16149,7 +16149,7 @@
           <a:p>
             <a:fld id="{48A87A34-81AB-432B-8DAE-1953F412C126}" type="datetimeFigureOut">
               <a:rPr lang="en-US" smtClean="0"/>
-              <a:t>1/9/2019</a:t>
+              <a:t>1/10/2019</a:t>
             </a:fld>
             <a:endParaRPr lang="en-US" dirty="0"/>
           </a:p>
@@ -16567,7 +16567,7 @@
           <a:p>
             <a:fld id="{48A87A34-81AB-432B-8DAE-1953F412C126}" type="datetimeFigureOut">
               <a:rPr lang="en-US" smtClean="0"/>
-              <a:t>1/9/2019</a:t>
+              <a:t>1/10/2019</a:t>
             </a:fld>
             <a:endParaRPr lang="en-US" dirty="0"/>
           </a:p>
@@ -16702,7 +16702,7 @@
           <a:p>
             <a:fld id="{48A87A34-81AB-432B-8DAE-1953F412C126}" type="datetimeFigureOut">
               <a:rPr lang="en-US" smtClean="0"/>
-              <a:t>1/9/2019</a:t>
+              <a:t>1/10/2019</a:t>
             </a:fld>
             <a:endParaRPr lang="en-US" dirty="0"/>
           </a:p>
@@ -16805,7 +16805,7 @@
           <a:p>
             <a:fld id="{48A87A34-81AB-432B-8DAE-1953F412C126}" type="datetimeFigureOut">
               <a:rPr lang="en-US" smtClean="0"/>
-              <a:t>1/9/2019</a:t>
+              <a:t>1/10/2019</a:t>
             </a:fld>
             <a:endParaRPr lang="en-US" dirty="0"/>
           </a:p>
@@ -17894,7 +17894,7 @@
           <a:p>
             <a:fld id="{48A87A34-81AB-432B-8DAE-1953F412C126}" type="datetimeFigureOut">
               <a:rPr lang="en-US" smtClean="0"/>
-              <a:t>1/9/2019</a:t>
+              <a:t>1/10/2019</a:t>
             </a:fld>
             <a:endParaRPr lang="en-US" dirty="0"/>
           </a:p>
@@ -19010,7 +19010,7 @@
           <a:p>
             <a:fld id="{48A87A34-81AB-432B-8DAE-1953F412C126}" type="datetimeFigureOut">
               <a:rPr lang="en-US" smtClean="0"/>
-              <a:t>1/9/2019</a:t>
+              <a:t>1/10/2019</a:t>
             </a:fld>
             <a:endParaRPr lang="en-US" dirty="0"/>
           </a:p>
@@ -22671,10 +22671,10 @@
           </a:p>
           <a:p>
             <a:r>
-              <a:rPr lang="en-GB" dirty="0">
+              <a:rPr lang="en-GB" smtClean="0">
                 <a:hlinkClick r:id="rId2"/>
               </a:rPr>
-              <a:t>markgossa@blogspot.com</a:t>
+              <a:t>https://markgossa.blogspot.com</a:t>
             </a:r>
             <a:endParaRPr lang="en-GB" dirty="0"/>
           </a:p>

</xml_diff>